<commit_message>
Added my email and skype to presentation title page
</commit_message>
<xml_diff>
--- a/Presentations/AzureGlobalBootcamp - WebApps.pptx
+++ b/Presentations/AzureGlobalBootcamp - WebApps.pptx
@@ -5797,11 +5797,7 @@
             <a:pPr algn="l"/>
             <a:r>
               <a:rPr lang="en-US" sz="9600" dirty="0" smtClean="0"/>
-              <a:t>Web </a:t>
-            </a:r>
-            <a:r>
-              <a:rPr lang="en-US" sz="9600" dirty="0" smtClean="0"/>
-              <a:t>Apps</a:t>
+              <a:t>Web Apps</a:t>
             </a:r>
             <a:endParaRPr lang="en-US" sz="9600" dirty="0">
               <a:solidFill>
@@ -5829,7 +5825,7 @@
         </p:spPr>
         <p:txBody>
           <a:bodyPr>
-            <a:normAutofit/>
+            <a:normAutofit fontScale="92500" lnSpcReduction="20000"/>
           </a:bodyPr>
           <a:lstStyle/>
           <a:p>
@@ -5843,12 +5839,6 @@
               </a:rPr>
               <a:t>Dmytro Mykhailov</a:t>
             </a:r>
-            <a:endParaRPr lang="en-US" sz="4400" dirty="0" smtClean="0">
-              <a:solidFill>
-                <a:srgbClr val="00B0F0"/>
-              </a:solidFill>
-              <a:latin typeface="+mj-lt"/>
-            </a:endParaRPr>
           </a:p>
           <a:p>
             <a:r>
@@ -5858,7 +5848,16 @@
                 </a:solidFill>
                 <a:latin typeface="+mj-lt"/>
               </a:rPr>
-              <a:t>Lead Software Engineer</a:t>
+              <a:t>Lead Software </a:t>
+            </a:r>
+            <a:r>
+              <a:rPr lang="en-US" sz="2800" dirty="0" smtClean="0">
+                <a:solidFill>
+                  <a:schemeClr val="bg1"/>
+                </a:solidFill>
+                <a:latin typeface="+mj-lt"/>
+              </a:rPr>
+              <a:t>Engineer @ EPAM Systems</a:t>
             </a:r>
             <a:endParaRPr lang="en-US" sz="2800" dirty="0" smtClean="0">
               <a:solidFill>
@@ -5869,10 +5868,41 @@
           </a:p>
           <a:p>
             <a:pPr algn="l"/>
-            <a:endParaRPr lang="en-US" sz="3200" dirty="0" smtClean="0">
+            <a:r>
+              <a:rPr lang="en-US" sz="1900" dirty="0" smtClean="0">
+                <a:solidFill>
+                  <a:schemeClr val="bg1"/>
+                </a:solidFill>
+                <a:latin typeface="+mj-lt"/>
+              </a:rPr>
+              <a:t>email: dmytro_mykhailov@epam.com</a:t>
+            </a:r>
+          </a:p>
+          <a:p>
+            <a:pPr algn="l"/>
+            <a:r>
+              <a:rPr lang="en-US" sz="1900" dirty="0" smtClean="0">
+                <a:solidFill>
+                  <a:schemeClr val="bg1"/>
+                </a:solidFill>
+                <a:latin typeface="+mj-lt"/>
+              </a:rPr>
+              <a:t>skype: </a:t>
+            </a:r>
+            <a:r>
+              <a:rPr lang="en-US" sz="1900" dirty="0" err="1" smtClean="0">
+                <a:solidFill>
+                  <a:schemeClr val="bg1"/>
+                </a:solidFill>
+                <a:latin typeface="+mj-lt"/>
+              </a:rPr>
+              <a:t>dmitry.mikhaylov</a:t>
+            </a:r>
+            <a:endParaRPr lang="en-US" sz="1900" dirty="0" smtClean="0">
               <a:solidFill>
-                <a:srgbClr val="92D050"/>
+                <a:schemeClr val="bg1"/>
               </a:solidFill>
+              <a:latin typeface="+mj-lt"/>
             </a:endParaRPr>
           </a:p>
         </p:txBody>
@@ -6930,11 +6960,7 @@
             <a:pPr algn="ctr"/>
             <a:r>
               <a:rPr lang="en-US" sz="1600" dirty="0" smtClean="0"/>
-              <a:t>Azure SQL </a:t>
-            </a:r>
-            <a:r>
-              <a:rPr lang="en-US" sz="1600" dirty="0" smtClean="0"/>
-              <a:t>Database</a:t>
+              <a:t>Azure SQL Database</a:t>
             </a:r>
             <a:endParaRPr lang="en-US" sz="1600" dirty="0"/>
           </a:p>
@@ -7793,11 +7819,6 @@
               </a:rPr>
               <a:t>All resources in an application together.</a:t>
             </a:r>
-            <a:endParaRPr lang="en-US" sz="2800" i="1" dirty="0">
-              <a:solidFill>
-                <a:schemeClr val="accent2"/>
-              </a:solidFill>
-            </a:endParaRPr>
           </a:p>
         </p:txBody>
       </p:sp>
@@ -8041,23 +8062,7 @@
                   </a:outerShdw>
                 </a:effectLst>
               </a:rPr>
-              <a:t>Azure SQL </a:t>
-            </a:r>
-            <a:r>
-              <a:rPr lang="en-US" sz="1400" dirty="0" smtClean="0">
-                <a:ln w="0"/>
-                <a:solidFill>
-                  <a:schemeClr val="tx1"/>
-                </a:solidFill>
-                <a:effectLst>
-                  <a:outerShdw blurRad="38100" dist="19050" dir="2700000" algn="tl" rotWithShape="0">
-                    <a:schemeClr val="dk1">
-                      <a:alpha val="40000"/>
-                    </a:schemeClr>
-                  </a:outerShdw>
-                </a:effectLst>
-              </a:rPr>
-              <a:t>Database</a:t>
+              <a:t>Azure SQL Database</a:t>
             </a:r>
             <a:endParaRPr lang="en-US" sz="1400" dirty="0">
               <a:ln w="0"/>
@@ -8324,23 +8329,7 @@
                   </a:outerShdw>
                 </a:effectLst>
               </a:rPr>
-              <a:t>Azure SQL </a:t>
-            </a:r>
-            <a:r>
-              <a:rPr lang="en-US" sz="1400" dirty="0" smtClean="0">
-                <a:ln w="0"/>
-                <a:solidFill>
-                  <a:schemeClr val="tx1"/>
-                </a:solidFill>
-                <a:effectLst>
-                  <a:outerShdw blurRad="38100" dist="19050" dir="2700000" algn="tl" rotWithShape="0">
-                    <a:schemeClr val="dk1">
-                      <a:alpha val="40000"/>
-                    </a:schemeClr>
-                  </a:outerShdw>
-                </a:effectLst>
-              </a:rPr>
-              <a:t>Database</a:t>
+              <a:t>Azure SQL Database</a:t>
             </a:r>
             <a:endParaRPr lang="en-US" sz="1400" dirty="0">
               <a:ln w="0"/>
@@ -15940,13 +15929,6 @@
               </a:rPr>
               <a:t>WebApps Overview</a:t>
             </a:r>
-            <a:endParaRPr lang="en-US" sz="4000" dirty="0" smtClean="0">
-              <a:solidFill>
-                <a:schemeClr val="bg1"/>
-              </a:solidFill>
-              <a:latin typeface="+mj-lt"/>
-              <a:sym typeface="Wingdings" panose="05000000000000000000" pitchFamily="2" charset="2"/>
-            </a:endParaRPr>
           </a:p>
           <a:p>
             <a:pPr marL="571500" indent="-571500">
@@ -15963,13 +15945,6 @@
               </a:rPr>
               <a:t>Creating Environment</a:t>
             </a:r>
-            <a:endParaRPr lang="en-US" sz="4000" dirty="0" smtClean="0">
-              <a:solidFill>
-                <a:schemeClr val="bg1"/>
-              </a:solidFill>
-              <a:latin typeface="+mj-lt"/>
-              <a:sym typeface="Wingdings" panose="05000000000000000000" pitchFamily="2" charset="2"/>
-            </a:endParaRPr>
           </a:p>
           <a:p>
             <a:pPr marL="571500" indent="-571500">
@@ -16002,13 +15977,6 @@
               </a:rPr>
               <a:t>Scale</a:t>
             </a:r>
-            <a:endParaRPr lang="en-US" sz="4000" dirty="0" smtClean="0">
-              <a:solidFill>
-                <a:schemeClr val="bg1"/>
-              </a:solidFill>
-              <a:latin typeface="+mj-lt"/>
-              <a:sym typeface="Wingdings" panose="05000000000000000000" pitchFamily="2" charset="2"/>
-            </a:endParaRPr>
           </a:p>
         </p:txBody>
       </p:sp>
@@ -28460,13 +28428,13 @@
   <p:clrMapOvr>
     <a:masterClrMapping/>
   </p:clrMapOvr>
-  <mc:AlternateContent xmlns:mc="http://schemas.openxmlformats.org/markup-compatibility/2006">
-    <mc:Choice xmlns:p14="http://schemas.microsoft.com/office/powerpoint/2010/main" Requires="p14">
+  <mc:AlternateContent xmlns:mc="http://schemas.openxmlformats.org/markup-compatibility/2006" xmlns:p14="http://schemas.microsoft.com/office/powerpoint/2010/main">
+    <mc:Choice Requires="p14">
       <p:transition spd="med" p14:dur="700">
         <p:fade/>
       </p:transition>
     </mc:Choice>
-    <mc:Fallback>
+    <mc:Fallback xmlns="">
       <p:transition spd="med">
         <p:fade/>
       </p:transition>
@@ -28573,13 +28541,6 @@
               </a:rPr>
               <a:t>Publish existing ASP.Net MVC application to Azure Web Apps, with scripts that can be used with CI/CD systems.</a:t>
             </a:r>
-            <a:endParaRPr lang="en-US" sz="4000" dirty="0" smtClean="0">
-              <a:solidFill>
-                <a:schemeClr val="bg1"/>
-              </a:solidFill>
-              <a:latin typeface="+mj-lt"/>
-              <a:sym typeface="Wingdings" panose="05000000000000000000" pitchFamily="2" charset="2"/>
-            </a:endParaRPr>
           </a:p>
           <a:p>
             <a:pPr marL="571500" indent="-571500">
@@ -28596,13 +28557,6 @@
               </a:rPr>
               <a:t>Check how to work with the published site: check logs, do maintenance and verifications.</a:t>
             </a:r>
-            <a:endParaRPr lang="en-US" sz="4000" dirty="0" smtClean="0">
-              <a:solidFill>
-                <a:schemeClr val="bg1"/>
-              </a:solidFill>
-              <a:latin typeface="+mj-lt"/>
-              <a:sym typeface="Wingdings" panose="05000000000000000000" pitchFamily="2" charset="2"/>
-            </a:endParaRPr>
           </a:p>
           <a:p>
             <a:pPr marL="571500" indent="-571500">
@@ -28619,13 +28573,6 @@
               </a:rPr>
               <a:t>Deploy new version of the application.</a:t>
             </a:r>
-            <a:endParaRPr lang="en-US" sz="4000" dirty="0" smtClean="0">
-              <a:solidFill>
-                <a:schemeClr val="bg1"/>
-              </a:solidFill>
-              <a:latin typeface="+mj-lt"/>
-              <a:sym typeface="Wingdings" panose="05000000000000000000" pitchFamily="2" charset="2"/>
-            </a:endParaRPr>
           </a:p>
           <a:p>
             <a:pPr marL="571500" indent="-571500">
@@ -28661,13 +28608,13 @@
   <p:clrMapOvr>
     <a:masterClrMapping/>
   </p:clrMapOvr>
-  <mc:AlternateContent xmlns:mc="http://schemas.openxmlformats.org/markup-compatibility/2006">
-    <mc:Choice xmlns:p14="http://schemas.microsoft.com/office/powerpoint/2010/main" Requires="p14">
+  <mc:AlternateContent xmlns:mc="http://schemas.openxmlformats.org/markup-compatibility/2006" xmlns:p14="http://schemas.microsoft.com/office/powerpoint/2010/main">
+    <mc:Choice Requires="p14">
       <p:transition spd="med" p14:dur="700">
         <p:fade/>
       </p:transition>
     </mc:Choice>
-    <mc:Fallback>
+    <mc:Fallback xmlns="">
       <p:transition spd="med">
         <p:fade/>
       </p:transition>
@@ -36585,13 +36532,13 @@
   <p:clrMapOvr>
     <a:masterClrMapping/>
   </p:clrMapOvr>
-  <mc:AlternateContent xmlns:mc="http://schemas.openxmlformats.org/markup-compatibility/2006">
-    <mc:Choice xmlns:p14="http://schemas.microsoft.com/office/powerpoint/2010/main" Requires="p14">
+  <mc:AlternateContent xmlns:mc="http://schemas.openxmlformats.org/markup-compatibility/2006" xmlns:p14="http://schemas.microsoft.com/office/powerpoint/2010/main">
+    <mc:Choice Requires="p14">
       <p:transition spd="med" p14:dur="700">
         <p:fade/>
       </p:transition>
     </mc:Choice>
-    <mc:Fallback>
+    <mc:Fallback xmlns="">
       <p:transition spd="med">
         <p:fade/>
       </p:transition>
@@ -36834,13 +36781,13 @@
   <p:clrMapOvr>
     <a:masterClrMapping/>
   </p:clrMapOvr>
-  <mc:AlternateContent xmlns:mc="http://schemas.openxmlformats.org/markup-compatibility/2006">
-    <mc:Choice xmlns:p14="http://schemas.microsoft.com/office/powerpoint/2010/main" Requires="p14">
+  <mc:AlternateContent xmlns:mc="http://schemas.openxmlformats.org/markup-compatibility/2006" xmlns:p14="http://schemas.microsoft.com/office/powerpoint/2010/main">
+    <mc:Choice Requires="p14">
       <p:transition spd="med" p14:dur="700">
         <p:fade/>
       </p:transition>
     </mc:Choice>
-    <mc:Fallback>
+    <mc:Fallback xmlns="">
       <p:transition spd="med">
         <p:fade/>
       </p:transition>
@@ -40315,13 +40262,7 @@
               <a:rPr lang="en-US" sz="4400" dirty="0" smtClean="0">
                 <a:latin typeface="+mj-lt"/>
               </a:rPr>
-              <a:t>Auto </a:t>
-            </a:r>
-            <a:r>
-              <a:rPr lang="en-US" sz="4400" dirty="0" smtClean="0">
-                <a:latin typeface="+mj-lt"/>
-              </a:rPr>
-              <a:t>Scale</a:t>
+              <a:t>Auto Scale</a:t>
             </a:r>
             <a:endParaRPr lang="en-US" sz="4400" dirty="0">
               <a:latin typeface="+mj-lt"/>
@@ -40501,13 +40442,13 @@
   <p:clrMapOvr>
     <a:masterClrMapping/>
   </p:clrMapOvr>
-  <mc:AlternateContent xmlns:mc="http://schemas.openxmlformats.org/markup-compatibility/2006">
-    <mc:Choice xmlns:p14="http://schemas.microsoft.com/office/powerpoint/2010/main" Requires="p14">
+  <mc:AlternateContent xmlns:mc="http://schemas.openxmlformats.org/markup-compatibility/2006" xmlns:p14="http://schemas.microsoft.com/office/powerpoint/2010/main">
+    <mc:Choice Requires="p14">
       <p:transition spd="med" p14:dur="700">
         <p:fade/>
       </p:transition>
     </mc:Choice>
-    <mc:Fallback>
+    <mc:Fallback xmlns="">
       <p:transition spd="med">
         <p:fade/>
       </p:transition>
@@ -44526,6 +44467,29 @@
 </file>
 
 <file path=customXml/item1.xml><?xml version="1.0" encoding="utf-8"?>
+<?mso-contentType ?>
+<FormTemplates xmlns="http://schemas.microsoft.com/sharepoint/v3/contenttype/forms">
+  <Display>DocumentLibraryForm</Display>
+  <Edit>DocumentLibraryForm</Edit>
+  <New>DocumentLibraryForm</New>
+</FormTemplates>
+</file>
+
+<file path=customXml/item2.xml><?xml version="1.0" encoding="utf-8"?>
+<p:properties xmlns:p="http://schemas.microsoft.com/office/2006/metadata/properties" xmlns:xsi="http://www.w3.org/2001/XMLSchema-instance" xmlns:pc="http://schemas.microsoft.com/office/infopath/2007/PartnerControls">
+  <documentManagement>
+    <SharedWithUsers xmlns="fee586e5-3c92-48eb-9898-42915e590ada">
+      <UserInfo>
+        <DisplayName>Rick Claus</DisplayName>
+        <AccountId>401</AccountId>
+        <AccountType/>
+      </UserInfo>
+    </SharedWithUsers>
+  </documentManagement>
+</p:properties>
+</file>
+
+<file path=customXml/item3.xml><?xml version="1.0" encoding="utf-8"?>
 <ct:contentTypeSchema xmlns:ct="http://schemas.microsoft.com/office/2006/metadata/contentType" xmlns:ma="http://schemas.microsoft.com/office/2006/metadata/properties/metaAttributes" ct:_="" ma:_="" ma:contentTypeName="Document" ma:contentTypeID="0x0101004A821E223A3BC347949CC2419033DBE2" ma:contentTypeVersion="1" ma:contentTypeDescription="Create a new document." ma:contentTypeScope="" ma:versionID="519c6bc90736a6e8abbbdb38ed934ac6">
   <xsd:schema xmlns:xsd="http://www.w3.org/2001/XMLSchema" xmlns:xs="http://www.w3.org/2001/XMLSchema" xmlns:p="http://schemas.microsoft.com/office/2006/metadata/properties" xmlns:ns2="fee586e5-3c92-48eb-9898-42915e590ada" targetNamespace="http://schemas.microsoft.com/office/2006/metadata/properties" ma:root="true" ma:fieldsID="4da06bcf8031bc55fa8390c6716287b0" ns2:_="">
     <xsd:import namespace="fee586e5-3c92-48eb-9898-42915e590ada"/>
@@ -44665,30 +44629,31 @@
 </ct:contentTypeSchema>
 </file>
 
-<file path=customXml/item2.xml><?xml version="1.0" encoding="utf-8"?>
-<?mso-contentType ?>
-<FormTemplates xmlns="http://schemas.microsoft.com/sharepoint/v3/contenttype/forms">
-  <Display>DocumentLibraryForm</Display>
-  <Edit>DocumentLibraryForm</Edit>
-  <New>DocumentLibraryForm</New>
-</FormTemplates>
+<file path=customXml/itemProps1.xml><?xml version="1.0" encoding="utf-8"?>
+<ds:datastoreItem xmlns:ds="http://schemas.openxmlformats.org/officeDocument/2006/customXml" ds:itemID="{14B32142-DE2C-423C-A302-95CAC214862A}">
+  <ds:schemaRefs>
+    <ds:schemaRef ds:uri="http://schemas.microsoft.com/sharepoint/v3/contenttype/forms"/>
+  </ds:schemaRefs>
+</ds:datastoreItem>
 </file>
 
-<file path=customXml/item3.xml><?xml version="1.0" encoding="utf-8"?>
-<p:properties xmlns:p="http://schemas.microsoft.com/office/2006/metadata/properties" xmlns:xsi="http://www.w3.org/2001/XMLSchema-instance" xmlns:pc="http://schemas.microsoft.com/office/infopath/2007/PartnerControls">
-  <documentManagement>
-    <SharedWithUsers xmlns="fee586e5-3c92-48eb-9898-42915e590ada">
-      <UserInfo>
-        <DisplayName>Rick Claus</DisplayName>
-        <AccountId>401</AccountId>
-        <AccountType/>
-      </UserInfo>
-    </SharedWithUsers>
-  </documentManagement>
-</p:properties>
+<file path=customXml/itemProps2.xml><?xml version="1.0" encoding="utf-8"?>
+<ds:datastoreItem xmlns:ds="http://schemas.openxmlformats.org/officeDocument/2006/customXml" ds:itemID="{B030EFEA-9AEA-457C-BAA8-93C4281792F5}">
+  <ds:schemaRefs>
+    <ds:schemaRef ds:uri="http://schemas.openxmlformats.org/package/2006/metadata/core-properties"/>
+    <ds:schemaRef ds:uri="http://purl.org/dc/terms/"/>
+    <ds:schemaRef ds:uri="fee586e5-3c92-48eb-9898-42915e590ada"/>
+    <ds:schemaRef ds:uri="http://www.w3.org/XML/1998/namespace"/>
+    <ds:schemaRef ds:uri="http://purl.org/dc/elements/1.1/"/>
+    <ds:schemaRef ds:uri="http://schemas.microsoft.com/office/2006/documentManagement/types"/>
+    <ds:schemaRef ds:uri="http://purl.org/dc/dcmitype/"/>
+    <ds:schemaRef ds:uri="http://schemas.microsoft.com/office/infopath/2007/PartnerControls"/>
+    <ds:schemaRef ds:uri="http://schemas.microsoft.com/office/2006/metadata/properties"/>
+  </ds:schemaRefs>
+</ds:datastoreItem>
 </file>
 
-<file path=customXml/itemProps1.xml><?xml version="1.0" encoding="utf-8"?>
+<file path=customXml/itemProps3.xml><?xml version="1.0" encoding="utf-8"?>
 <ds:datastoreItem xmlns:ds="http://schemas.openxmlformats.org/officeDocument/2006/customXml" ds:itemID="{3469201C-D4CA-4918-A4FF-8ED15147EC4D}">
   <ds:schemaRefs>
     <ds:schemaRef ds:uri="http://schemas.microsoft.com/office/2006/metadata/contentType"/>
@@ -44704,28 +44669,4 @@
     <ds:schemaRef ds:uri="http://schemas.microsoft.com/internal/obd"/>
   </ds:schemaRefs>
 </ds:datastoreItem>
-</file>
-
-<file path=customXml/itemProps2.xml><?xml version="1.0" encoding="utf-8"?>
-<ds:datastoreItem xmlns:ds="http://schemas.openxmlformats.org/officeDocument/2006/customXml" ds:itemID="{14B32142-DE2C-423C-A302-95CAC214862A}">
-  <ds:schemaRefs>
-    <ds:schemaRef ds:uri="http://schemas.microsoft.com/sharepoint/v3/contenttype/forms"/>
-  </ds:schemaRefs>
-</ds:datastoreItem>
-</file>
-
-<file path=customXml/itemProps3.xml><?xml version="1.0" encoding="utf-8"?>
-<ds:datastoreItem xmlns:ds="http://schemas.openxmlformats.org/officeDocument/2006/customXml" ds:itemID="{B030EFEA-9AEA-457C-BAA8-93C4281792F5}">
-  <ds:schemaRefs>
-    <ds:schemaRef ds:uri="http://schemas.openxmlformats.org/package/2006/metadata/core-properties"/>
-    <ds:schemaRef ds:uri="http://purl.org/dc/terms/"/>
-    <ds:schemaRef ds:uri="fee586e5-3c92-48eb-9898-42915e590ada"/>
-    <ds:schemaRef ds:uri="http://www.w3.org/XML/1998/namespace"/>
-    <ds:schemaRef ds:uri="http://purl.org/dc/elements/1.1/"/>
-    <ds:schemaRef ds:uri="http://schemas.microsoft.com/office/2006/documentManagement/types"/>
-    <ds:schemaRef ds:uri="http://purl.org/dc/dcmitype/"/>
-    <ds:schemaRef ds:uri="http://schemas.microsoft.com/office/infopath/2007/PartnerControls"/>
-    <ds:schemaRef ds:uri="http://schemas.microsoft.com/office/2006/metadata/properties"/>
-  </ds:schemaRefs>
-</ds:datastoreItem>
 </file>
</xml_diff>